<commit_message>
Added Java translator and two templates
Added Java translator and two templates
</commit_message>
<xml_diff>
--- a/data/templates/simplified/dove-paper-16-9.pptx
+++ b/data/templates/simplified/dove-paper-16-9.pptx
@@ -220,8 +220,9 @@
                     <a:lumMod val="50000"/>
                   </a:schemeClr>
                 </a:solidFill>
-                <a:latin typeface="5L2F-LISU-S" panose="02010609000101010101" pitchFamily="49" charset="-122"/>
-                <a:ea typeface="5L2F-LISU-S" panose="02010609000101010101" pitchFamily="49" charset="-122"/>
+                <a:latin typeface="5L2F-KAISU-S" panose="03000509000000000000" pitchFamily="65" charset="-128"/>
+                <a:ea typeface="5L2F-KAISU-S" panose="03000509000000000000" pitchFamily="65" charset="-128"/>
+                <a:cs typeface="5L2F-KAISU-S" panose="03000509000000000000" pitchFamily="65" charset="-128"/>
               </a:defRPr>
             </a:lvl1pPr>
             <a:lvl2pPr marL="342900" indent="0" algn="ctr">
@@ -420,8 +421,9 @@
                     <a:lumMod val="50000"/>
                   </a:schemeClr>
                 </a:solidFill>
-                <a:latin typeface="5L2F-LISU-S" panose="02010609000101010101" pitchFamily="49" charset="-122"/>
-                <a:ea typeface="5L2F-LISU-S" panose="02010609000101010101" pitchFamily="49" charset="-122"/>
+                <a:latin typeface="5L2F-KAISU-S" panose="03000509000000000000" pitchFamily="65" charset="-128"/>
+                <a:ea typeface="5L2F-KAISU-S" panose="03000509000000000000" pitchFamily="65" charset="-128"/>
+                <a:cs typeface="5L2F-KAISU-S" panose="03000509000000000000" pitchFamily="65" charset="-128"/>
               </a:defRPr>
             </a:lvl1pPr>
             <a:lvl2pPr marL="342900" indent="0" algn="ctr">
@@ -620,8 +622,9 @@
                     <a:lumMod val="50000"/>
                   </a:schemeClr>
                 </a:solidFill>
-                <a:latin typeface="5L2F-LISU-S" panose="02010609000101010101" pitchFamily="49" charset="-122"/>
-                <a:ea typeface="5L2F-LISU-S" panose="02010609000101010101" pitchFamily="49" charset="-122"/>
+                <a:latin typeface="5L2F-KAISU-S" panose="03000509000000000000" pitchFamily="65" charset="-128"/>
+                <a:ea typeface="5L2F-KAISU-S" panose="03000509000000000000" pitchFamily="65" charset="-128"/>
+                <a:cs typeface="5L2F-KAISU-S" panose="03000509000000000000" pitchFamily="65" charset="-128"/>
               </a:defRPr>
             </a:lvl1pPr>
             <a:lvl2pPr marL="342900" indent="0" algn="ctr">
@@ -820,8 +823,9 @@
                     <a:lumMod val="50000"/>
                   </a:schemeClr>
                 </a:solidFill>
-                <a:latin typeface="5L2F-LISU-S" panose="02010609000101010101" pitchFamily="49" charset="-122"/>
-                <a:ea typeface="5L2F-LISU-S" panose="02010609000101010101" pitchFamily="49" charset="-122"/>
+                <a:latin typeface="5L2F-KAISU-S" panose="03000509000000000000" pitchFamily="65" charset="-128"/>
+                <a:ea typeface="5L2F-KAISU-S" panose="03000509000000000000" pitchFamily="65" charset="-128"/>
+                <a:cs typeface="5L2F-KAISU-S" panose="03000509000000000000" pitchFamily="65" charset="-128"/>
               </a:defRPr>
             </a:lvl1pPr>
             <a:lvl2pPr marL="342900" indent="0" algn="ctr">

</xml_diff>

<commit_message>
Updated simplified Chinese generation process.
Updated simplified Chinese generation process.
</commit_message>
<xml_diff>
--- a/data/templates/simplified/dove-paper-16-9.pptx
+++ b/data/templates/simplified/dove-paper-16-9.pptx
@@ -191,7 +191,7 @@
         <p:spPr>
           <a:xfrm>
             <a:off x="668216" y="926020"/>
-            <a:ext cx="11676184" cy="5659418"/>
+            <a:ext cx="10796955" cy="5659418"/>
           </a:xfrm>
         </p:spPr>
         <p:txBody>
@@ -1068,7 +1068,7 @@
             <a:fld id="{48A87A34-81AB-432B-8DAE-1953F412C126}" type="datetimeFigureOut">
               <a:rPr lang="en-US" smtClean="0"/>
               <a:pPr/>
-              <a:t>10/22/2018</a:t>
+              <a:t>10/23/2018</a:t>
             </a:fld>
             <a:endParaRPr lang="en-US" dirty="0"/>
           </a:p>

</xml_diff>